<commit_message>
Slede day10 - sqlite
</commit_message>
<xml_diff>
--- a/docs/Python_08_OOP.pptx
+++ b/docs/Python_08_OOP.pptx
@@ -5,7 +5,7 @@
     <p:sldMasterId id="2147483648" r:id="rId1"/>
   </p:sldMasterIdLst>
   <p:notesMasterIdLst>
-    <p:notesMasterId r:id="rId18"/>
+    <p:notesMasterId r:id="rId19"/>
   </p:notesMasterIdLst>
   <p:sldIdLst>
     <p:sldId id="256" r:id="rId2"/>
@@ -24,6 +24,7 @@
     <p:sldId id="268" r:id="rId15"/>
     <p:sldId id="266" r:id="rId16"/>
     <p:sldId id="267" r:id="rId17"/>
+    <p:sldId id="273" r:id="rId18"/>
   </p:sldIdLst>
   <p:sldSz cx="9144000" cy="6858000" type="screen4x3"/>
   <p:notesSz cx="6858000" cy="9144000"/>
@@ -16900,6 +16901,221 @@
     <a:masterClrMapping/>
   </p:clrMapOvr>
   <p:transition/>
+</p:sld>
+</file>
+
+<file path=ppt/slides/slide17.xml><?xml version="1.0" encoding="utf-8"?>
+<p:sld xmlns:a="http://schemas.openxmlformats.org/drawingml/2006/main" xmlns:r="http://schemas.openxmlformats.org/officeDocument/2006/relationships" xmlns:p="http://schemas.openxmlformats.org/presentationml/2006/main">
+  <p:cSld>
+    <p:spTree>
+      <p:nvGrpSpPr>
+        <p:cNvPr id="1" name=""/>
+        <p:cNvGrpSpPr/>
+        <p:nvPr/>
+      </p:nvGrpSpPr>
+      <p:grpSpPr>
+        <a:xfrm>
+          <a:off x="0" y="0"/>
+          <a:ext cx="0" cy="0"/>
+          <a:chOff x="0" y="0"/>
+          <a:chExt cx="0" cy="0"/>
+        </a:xfrm>
+      </p:grpSpPr>
+      <p:sp>
+        <p:nvSpPr>
+          <p:cNvPr id="2" name="Title 1">
+            <a:extLst>
+              <a:ext uri="{FF2B5EF4-FFF2-40B4-BE49-F238E27FC236}">
+                <a16:creationId xmlns:a16="http://schemas.microsoft.com/office/drawing/2014/main" id="{B57CF74E-1D7C-493B-956C-8ED23CF2DBC5}"/>
+              </a:ext>
+            </a:extLst>
+          </p:cNvPr>
+          <p:cNvSpPr>
+            <a:spLocks noGrp="1"/>
+          </p:cNvSpPr>
+          <p:nvPr>
+            <p:ph type="title"/>
+          </p:nvPr>
+        </p:nvSpPr>
+        <p:spPr/>
+        <p:txBody>
+          <a:bodyPr/>
+          <a:lstStyle/>
+          <a:p>
+            <a:r>
+              <a:rPr lang="en-US"/>
+              <a:t>Static method</a:t>
+            </a:r>
+          </a:p>
+        </p:txBody>
+      </p:sp>
+      <p:sp>
+        <p:nvSpPr>
+          <p:cNvPr id="3" name="Content Placeholder 2">
+            <a:extLst>
+              <a:ext uri="{FF2B5EF4-FFF2-40B4-BE49-F238E27FC236}">
+                <a16:creationId xmlns:a16="http://schemas.microsoft.com/office/drawing/2014/main" id="{5F0A4214-C812-44B2-ADC6-90E2ADCC9E8E}"/>
+              </a:ext>
+            </a:extLst>
+          </p:cNvPr>
+          <p:cNvSpPr>
+            <a:spLocks noGrp="1"/>
+          </p:cNvSpPr>
+          <p:nvPr>
+            <p:ph idx="1"/>
+          </p:nvPr>
+        </p:nvSpPr>
+        <p:spPr/>
+        <p:txBody>
+          <a:bodyPr/>
+          <a:lstStyle/>
+          <a:p>
+            <a:r>
+              <a:rPr lang="en-US" sz="2800"/>
+              <a:t>Để định nghĩa method dạng static thì thêm từ khóa</a:t>
+            </a:r>
+          </a:p>
+          <a:p>
+            <a:pPr marL="0" indent="0">
+              <a:buNone/>
+            </a:pPr>
+            <a:r>
+              <a:rPr lang="en-US" b="1" i="1">
+                <a:solidFill>
+                  <a:srgbClr val="FF0000"/>
+                </a:solidFill>
+              </a:rPr>
+              <a:t>@staticmethod</a:t>
+            </a:r>
+            <a:endParaRPr lang="en-US" sz="2800" b="1" i="1">
+              <a:solidFill>
+                <a:srgbClr val="FF0000"/>
+              </a:solidFill>
+            </a:endParaRPr>
+          </a:p>
+          <a:p>
+            <a:r>
+              <a:rPr lang="en-US" sz="2800"/>
+              <a:t>Ví dụ:</a:t>
+            </a:r>
+          </a:p>
+          <a:p>
+            <a:pPr marL="0" indent="0">
+              <a:buNone/>
+            </a:pPr>
+            <a:r>
+              <a:rPr lang="en-US" sz="2800"/>
+              <a:t>class </a:t>
+            </a:r>
+            <a:r>
+              <a:rPr lang="en-US" sz="2800" b="1">
+                <a:solidFill>
+                  <a:srgbClr val="008000"/>
+                </a:solidFill>
+              </a:rPr>
+              <a:t>class_name</a:t>
+            </a:r>
+            <a:r>
+              <a:rPr lang="en-US" sz="2800"/>
+              <a:t>:</a:t>
+            </a:r>
+          </a:p>
+          <a:p>
+            <a:pPr marL="0" indent="0">
+              <a:buNone/>
+            </a:pPr>
+            <a:r>
+              <a:rPr lang="en-US" sz="2800"/>
+              <a:t>	</a:t>
+            </a:r>
+            <a:r>
+              <a:rPr lang="en-US" sz="2800" i="1">
+                <a:solidFill>
+                  <a:srgbClr val="FF0000"/>
+                </a:solidFill>
+              </a:rPr>
+              <a:t>@staticmethod</a:t>
+            </a:r>
+          </a:p>
+          <a:p>
+            <a:pPr marL="0" indent="0">
+              <a:buNone/>
+            </a:pPr>
+            <a:r>
+              <a:rPr lang="en-US" sz="2800"/>
+              <a:t>	def </a:t>
+            </a:r>
+            <a:r>
+              <a:rPr lang="en-US" sz="2800" b="1">
+                <a:solidFill>
+                  <a:srgbClr val="800000"/>
+                </a:solidFill>
+              </a:rPr>
+              <a:t>static_method_name</a:t>
+            </a:r>
+            <a:r>
+              <a:rPr lang="en-US" sz="2800"/>
+              <a:t>(param_list):</a:t>
+            </a:r>
+          </a:p>
+          <a:p>
+            <a:pPr marL="0" indent="0">
+              <a:buNone/>
+            </a:pPr>
+            <a:r>
+              <a:rPr lang="en-US" sz="2800"/>
+              <a:t>		pass</a:t>
+            </a:r>
+            <a:endParaRPr lang="en-US" sz="3200"/>
+          </a:p>
+          <a:p>
+            <a:r>
+              <a:rPr lang="en-US" sz="2800"/>
+              <a:t>Cách gọi:</a:t>
+            </a:r>
+          </a:p>
+          <a:p>
+            <a:pPr marL="457200" lvl="1" indent="0">
+              <a:buNone/>
+            </a:pPr>
+            <a:r>
+              <a:rPr lang="en-US" sz="2800" b="1">
+                <a:solidFill>
+                  <a:srgbClr val="008000"/>
+                </a:solidFill>
+              </a:rPr>
+              <a:t>class_name</a:t>
+            </a:r>
+            <a:r>
+              <a:rPr lang="en-US" sz="2800"/>
+              <a:t>.</a:t>
+            </a:r>
+            <a:r>
+              <a:rPr lang="en-US" sz="2800" b="1">
+                <a:solidFill>
+                  <a:srgbClr val="800000"/>
+                </a:solidFill>
+              </a:rPr>
+              <a:t>static_method_name</a:t>
+            </a:r>
+            <a:r>
+              <a:rPr lang="en-US" sz="2800"/>
+              <a:t>()</a:t>
+            </a:r>
+            <a:endParaRPr lang="en-US" sz="3200"/>
+          </a:p>
+        </p:txBody>
+      </p:sp>
+    </p:spTree>
+    <p:extLst>
+      <p:ext uri="{BB962C8B-B14F-4D97-AF65-F5344CB8AC3E}">
+        <p14:creationId xmlns:p14="http://schemas.microsoft.com/office/powerpoint/2010/main" val="3546485995"/>
+      </p:ext>
+    </p:extLst>
+  </p:cSld>
+  <p:clrMapOvr>
+    <a:masterClrMapping/>
+  </p:clrMapOvr>
 </p:sld>
 </file>
 

</xml_diff>